<commit_message>
added more to pp and updated read me of spelling errors
</commit_message>
<xml_diff>
--- a/Presidential GDP.pptx
+++ b/Presidential GDP.pptx
@@ -111,6 +111,11 @@
       </a:defRPr>
     </a:lvl9pPr>
   </p:defaultTextStyle>
+  <p:extLst>
+    <p:ext uri="{EFAFB233-063F-42B5-8137-9DF3F51BA10A}">
+      <p15:sldGuideLst xmlns:p15="http://schemas.microsoft.com/office/powerpoint/2012/main"/>
+    </p:ext>
+  </p:extLst>
 </p:presentation>
 </file>
 
@@ -3538,7 +3543,7 @@
         </p:blipFill>
         <p:spPr>
           <a:xfrm>
-            <a:off x="0" y="0"/>
+            <a:off x="5600004" y="0"/>
             <a:ext cx="6591996" cy="1677681"/>
           </a:xfrm>
           <a:prstGeom prst="rect">
@@ -3568,7 +3573,7 @@
         </p:blipFill>
         <p:spPr>
           <a:xfrm>
-            <a:off x="5091895" y="5013310"/>
+            <a:off x="0" y="5005365"/>
             <a:ext cx="7100105" cy="1844690"/>
           </a:xfrm>
           <a:prstGeom prst="rect">
@@ -3576,6 +3581,634 @@
           </a:prstGeom>
         </p:spPr>
       </p:pic>
+      <p:sp>
+        <p:nvSpPr>
+          <p:cNvPr id="2" name="TextBox 1">
+            <a:extLst>
+              <a:ext uri="{FF2B5EF4-FFF2-40B4-BE49-F238E27FC236}">
+                <a16:creationId xmlns:a16="http://schemas.microsoft.com/office/drawing/2014/main" id="{F5B9E817-E5E5-B753-FFF1-4632008128AE}"/>
+              </a:ext>
+            </a:extLst>
+          </p:cNvPr>
+          <p:cNvSpPr txBox="1"/>
+          <p:nvPr/>
+        </p:nvSpPr>
+        <p:spPr>
+          <a:xfrm>
+            <a:off x="467360" y="162560"/>
+            <a:ext cx="4785360" cy="1323439"/>
+          </a:xfrm>
+          <a:prstGeom prst="rect">
+            <a:avLst/>
+          </a:prstGeom>
+          <a:noFill/>
+        </p:spPr>
+        <p:txBody>
+          <a:bodyPr wrap="square" rtlCol="0">
+            <a:spAutoFit/>
+          </a:bodyPr>
+          <a:lstStyle/>
+          <a:p>
+            <a:r>
+              <a:rPr lang="en-US" sz="8000" b="1" u="sng" dirty="0">
+                <a:solidFill>
+                  <a:srgbClr val="002060"/>
+                </a:solidFill>
+                <a:latin typeface="Calibri Light" panose="020F0302020204030204" pitchFamily="34" charset="0"/>
+                <a:cs typeface="Calibri Light" panose="020F0302020204030204" pitchFamily="34" charset="0"/>
+              </a:rPr>
+              <a:t>Overview</a:t>
+            </a:r>
+          </a:p>
+        </p:txBody>
+      </p:sp>
+      <p:sp>
+        <p:nvSpPr>
+          <p:cNvPr id="3" name="TextBox 2">
+            <a:extLst>
+              <a:ext uri="{FF2B5EF4-FFF2-40B4-BE49-F238E27FC236}">
+                <a16:creationId xmlns:a16="http://schemas.microsoft.com/office/drawing/2014/main" id="{577211B7-FB58-D467-C12A-D4596445D4AE}"/>
+              </a:ext>
+            </a:extLst>
+          </p:cNvPr>
+          <p:cNvSpPr txBox="1"/>
+          <p:nvPr/>
+        </p:nvSpPr>
+        <p:spPr>
+          <a:xfrm>
+            <a:off x="1686560" y="2509520"/>
+            <a:ext cx="8808720" cy="1422400"/>
+          </a:xfrm>
+          <a:prstGeom prst="rect">
+            <a:avLst/>
+          </a:prstGeom>
+          <a:noFill/>
+        </p:spPr>
+        <p:txBody>
+          <a:bodyPr wrap="square" rtlCol="0">
+            <a:spAutoFit/>
+          </a:bodyPr>
+          <a:lstStyle/>
+          <a:p>
+            <a:endParaRPr lang="en-US" dirty="0"/>
+          </a:p>
+        </p:txBody>
+      </p:sp>
+      <p:sp>
+        <p:nvSpPr>
+          <p:cNvPr id="4" name="TextBox 3">
+            <a:extLst>
+              <a:ext uri="{FF2B5EF4-FFF2-40B4-BE49-F238E27FC236}">
+                <a16:creationId xmlns:a16="http://schemas.microsoft.com/office/drawing/2014/main" id="{2D75B7B7-84CF-C763-4A88-3CCA3341A5F1}"/>
+              </a:ext>
+            </a:extLst>
+          </p:cNvPr>
+          <p:cNvSpPr txBox="1"/>
+          <p:nvPr/>
+        </p:nvSpPr>
+        <p:spPr>
+          <a:xfrm>
+            <a:off x="382844" y="1777999"/>
+            <a:ext cx="4869876" cy="2308324"/>
+          </a:xfrm>
+          <a:prstGeom prst="rect">
+            <a:avLst/>
+          </a:prstGeom>
+          <a:noFill/>
+        </p:spPr>
+        <p:txBody>
+          <a:bodyPr wrap="square" rtlCol="0">
+            <a:spAutoFit/>
+          </a:bodyPr>
+          <a:lstStyle/>
+          <a:p>
+            <a:r>
+              <a:rPr lang="en-US" b="0" dirty="0">
+                <a:solidFill>
+                  <a:srgbClr val="C00000"/>
+                </a:solidFill>
+                <a:effectLst/>
+                <a:latin typeface="Calibri Light" panose="020F0302020204030204" pitchFamily="34" charset="0"/>
+                <a:cs typeface="Calibri Light" panose="020F0302020204030204" pitchFamily="34" charset="0"/>
+              </a:rPr>
+              <a:t>In our final project for SMU Data Bootcamps our team has decided to use Data Model Implementation and Optimization to try and predict President.</a:t>
+            </a:r>
+          </a:p>
+          <a:p>
+            <a:pPr marL="742950" lvl="1" indent="-285750">
+              <a:buFont typeface="Arial" panose="020B0604020202020204" pitchFamily="34" charset="0"/>
+              <a:buChar char="•"/>
+            </a:pPr>
+            <a:r>
+              <a:rPr lang="en-US" b="0" dirty="0">
+                <a:solidFill>
+                  <a:srgbClr val="C00000"/>
+                </a:solidFill>
+                <a:effectLst/>
+                <a:latin typeface="Calibri Light" panose="020F0302020204030204" pitchFamily="34" charset="0"/>
+                <a:cs typeface="Calibri Light" panose="020F0302020204030204" pitchFamily="34" charset="0"/>
+              </a:rPr>
+              <a:t>Would the US be prosperous?</a:t>
+            </a:r>
+          </a:p>
+          <a:p>
+            <a:pPr marL="742950" lvl="1" indent="-285750">
+              <a:buFont typeface="Arial" panose="020B0604020202020204" pitchFamily="34" charset="0"/>
+              <a:buChar char="•"/>
+            </a:pPr>
+            <a:r>
+              <a:rPr lang="en-US" b="0" dirty="0">
+                <a:solidFill>
+                  <a:srgbClr val="C00000"/>
+                </a:solidFill>
+                <a:effectLst/>
+                <a:latin typeface="Calibri Light" panose="020F0302020204030204" pitchFamily="34" charset="0"/>
+                <a:cs typeface="Calibri Light" panose="020F0302020204030204" pitchFamily="34" charset="0"/>
+              </a:rPr>
+              <a:t>Can the model output predict classification accuracy equal to or higher than 75% or with an 0.80 R-squared?</a:t>
+            </a:r>
+          </a:p>
+        </p:txBody>
+      </p:sp>
+      <p:sp>
+        <p:nvSpPr>
+          <p:cNvPr id="6" name="TextBox 5">
+            <a:extLst>
+              <a:ext uri="{FF2B5EF4-FFF2-40B4-BE49-F238E27FC236}">
+                <a16:creationId xmlns:a16="http://schemas.microsoft.com/office/drawing/2014/main" id="{F89C2F7C-0E4A-BB0B-072E-2DDB4E6DC265}"/>
+              </a:ext>
+            </a:extLst>
+          </p:cNvPr>
+          <p:cNvSpPr txBox="1"/>
+          <p:nvPr/>
+        </p:nvSpPr>
+        <p:spPr>
+          <a:xfrm>
+            <a:off x="7100104" y="1696719"/>
+            <a:ext cx="5091896" cy="5093702"/>
+          </a:xfrm>
+          <a:prstGeom prst="rect">
+            <a:avLst/>
+          </a:prstGeom>
+          <a:noFill/>
+        </p:spPr>
+        <p:txBody>
+          <a:bodyPr wrap="square" rtlCol="0">
+            <a:spAutoFit/>
+          </a:bodyPr>
+          <a:lstStyle/>
+          <a:p>
+            <a:r>
+              <a:rPr lang="en-US" sz="1600" b="1" dirty="0">
+                <a:solidFill>
+                  <a:srgbClr val="002060"/>
+                </a:solidFill>
+                <a:latin typeface="Calibri Light" panose="020F0302020204030204" pitchFamily="34" charset="0"/>
+                <a:cs typeface="Calibri Light" panose="020F0302020204030204" pitchFamily="34" charset="0"/>
+              </a:rPr>
+              <a:t>Stage 1 </a:t>
+            </a:r>
+          </a:p>
+          <a:p>
+            <a:r>
+              <a:rPr lang="en-US" sz="1100" b="1" dirty="0">
+                <a:solidFill>
+                  <a:srgbClr val="C00000"/>
+                </a:solidFill>
+                <a:latin typeface="Calibri Light" panose="020F0302020204030204" pitchFamily="34" charset="0"/>
+                <a:cs typeface="Calibri Light" panose="020F0302020204030204" pitchFamily="34" charset="0"/>
+              </a:rPr>
+              <a:t>Ingest and clean</a:t>
+            </a:r>
+          </a:p>
+          <a:p>
+            <a:pPr marL="171450" indent="-171450">
+              <a:buFont typeface="Arial" panose="020B0604020202020204" pitchFamily="34" charset="0"/>
+              <a:buChar char="•"/>
+            </a:pPr>
+            <a:r>
+              <a:rPr lang="en-US" sz="1100" dirty="0">
+                <a:solidFill>
+                  <a:srgbClr val="C00000"/>
+                </a:solidFill>
+                <a:latin typeface="Calibri Light" panose="020F0302020204030204" pitchFamily="34" charset="0"/>
+                <a:cs typeface="Calibri Light" panose="020F0302020204030204" pitchFamily="34" charset="0"/>
+              </a:rPr>
+              <a:t>Clean, normalize, and standardize data set</a:t>
+            </a:r>
+          </a:p>
+          <a:p>
+            <a:pPr marL="171450" indent="-171450">
+              <a:buFont typeface="Arial" panose="020B0604020202020204" pitchFamily="34" charset="0"/>
+              <a:buChar char="•"/>
+            </a:pPr>
+            <a:r>
+              <a:rPr lang="en-US" sz="1100" dirty="0">
+                <a:solidFill>
+                  <a:srgbClr val="C00000"/>
+                </a:solidFill>
+                <a:latin typeface="Calibri Light" panose="020F0302020204030204" pitchFamily="34" charset="0"/>
+                <a:cs typeface="Calibri Light" panose="020F0302020204030204" pitchFamily="34" charset="0"/>
+              </a:rPr>
+              <a:t>Upload data to a database (</a:t>
+            </a:r>
+            <a:r>
+              <a:rPr lang="en-US" sz="1100" dirty="0" err="1">
+                <a:solidFill>
+                  <a:srgbClr val="C00000"/>
+                </a:solidFill>
+                <a:latin typeface="Calibri Light" panose="020F0302020204030204" pitchFamily="34" charset="0"/>
+                <a:cs typeface="Calibri Light" panose="020F0302020204030204" pitchFamily="34" charset="0"/>
+              </a:rPr>
+              <a:t>postgress</a:t>
+            </a:r>
+            <a:r>
+              <a:rPr lang="en-US" sz="1100" dirty="0">
+                <a:solidFill>
+                  <a:srgbClr val="C00000"/>
+                </a:solidFill>
+                <a:latin typeface="Calibri Light" panose="020F0302020204030204" pitchFamily="34" charset="0"/>
+                <a:cs typeface="Calibri Light" panose="020F0302020204030204" pitchFamily="34" charset="0"/>
+              </a:rPr>
+              <a:t>)</a:t>
+            </a:r>
+          </a:p>
+          <a:p>
+            <a:endParaRPr lang="en-US" sz="1000" dirty="0">
+              <a:latin typeface="Calibri Light" panose="020F0302020204030204" pitchFamily="34" charset="0"/>
+              <a:cs typeface="Calibri Light" panose="020F0302020204030204" pitchFamily="34" charset="0"/>
+            </a:endParaRPr>
+          </a:p>
+          <a:p>
+            <a:r>
+              <a:rPr lang="en-US" sz="1600" b="1" dirty="0">
+                <a:solidFill>
+                  <a:srgbClr val="002060"/>
+                </a:solidFill>
+                <a:latin typeface="Calibri Light" panose="020F0302020204030204" pitchFamily="34" charset="0"/>
+                <a:cs typeface="Calibri Light" panose="020F0302020204030204" pitchFamily="34" charset="0"/>
+              </a:rPr>
+              <a:t>Stage</a:t>
+            </a:r>
+            <a:r>
+              <a:rPr lang="en-US" b="1" dirty="0">
+                <a:latin typeface="Calibri Light" panose="020F0302020204030204" pitchFamily="34" charset="0"/>
+                <a:cs typeface="Calibri Light" panose="020F0302020204030204" pitchFamily="34" charset="0"/>
+              </a:rPr>
+              <a:t> 2</a:t>
+            </a:r>
+          </a:p>
+          <a:p>
+            <a:r>
+              <a:rPr lang="en-US" sz="1100" b="1" dirty="0">
+                <a:solidFill>
+                  <a:srgbClr val="C00000"/>
+                </a:solidFill>
+                <a:latin typeface="Calibri Light" panose="020F0302020204030204" pitchFamily="34" charset="0"/>
+                <a:cs typeface="Calibri Light" panose="020F0302020204030204" pitchFamily="34" charset="0"/>
+              </a:rPr>
+              <a:t>Develop and optimize model</a:t>
+            </a:r>
+          </a:p>
+          <a:p>
+            <a:pPr marL="171450" indent="-171450">
+              <a:buFont typeface="Arial" panose="020B0604020202020204" pitchFamily="34" charset="0"/>
+              <a:buChar char="•"/>
+            </a:pPr>
+            <a:r>
+              <a:rPr lang="en-US" sz="1100" dirty="0">
+                <a:solidFill>
+                  <a:srgbClr val="C00000"/>
+                </a:solidFill>
+                <a:latin typeface="Calibri Light" panose="020F0302020204030204" pitchFamily="34" charset="0"/>
+                <a:cs typeface="Calibri Light" panose="020F0302020204030204" pitchFamily="34" charset="0"/>
+              </a:rPr>
+              <a:t>Initializes Python script, trains, and evaluates a model</a:t>
+            </a:r>
+          </a:p>
+          <a:p>
+            <a:pPr marL="628650" lvl="1" indent="-171450">
+              <a:buFont typeface="Arial" panose="020B0604020202020204" pitchFamily="34" charset="0"/>
+              <a:buChar char="•"/>
+            </a:pPr>
+            <a:r>
+              <a:rPr lang="en-US" sz="1100" dirty="0">
+                <a:solidFill>
+                  <a:srgbClr val="C00000"/>
+                </a:solidFill>
+                <a:latin typeface="Calibri Light" panose="020F0302020204030204" pitchFamily="34" charset="0"/>
+                <a:cs typeface="Calibri Light" panose="020F0302020204030204" pitchFamily="34" charset="0"/>
+              </a:rPr>
+              <a:t>Model output of predictive power at least 75% classification accuracy or 0.80 R-squared</a:t>
+            </a:r>
+          </a:p>
+          <a:p>
+            <a:r>
+              <a:rPr lang="en-US" sz="1100" b="1" dirty="0">
+                <a:solidFill>
+                  <a:srgbClr val="C00000"/>
+                </a:solidFill>
+                <a:latin typeface="Calibri Light" panose="020F0302020204030204" pitchFamily="34" charset="0"/>
+                <a:cs typeface="Calibri Light" panose="020F0302020204030204" pitchFamily="34" charset="0"/>
+              </a:rPr>
+              <a:t>Optimize model </a:t>
+            </a:r>
+          </a:p>
+          <a:p>
+            <a:pPr marL="171450" indent="-171450">
+              <a:buFont typeface="Arial" panose="020B0604020202020204" pitchFamily="34" charset="0"/>
+              <a:buChar char="•"/>
+            </a:pPr>
+            <a:r>
+              <a:rPr lang="en-US" sz="1100" dirty="0">
+                <a:solidFill>
+                  <a:srgbClr val="C00000"/>
+                </a:solidFill>
+                <a:latin typeface="Calibri Light" panose="020F0302020204030204" pitchFamily="34" charset="0"/>
+                <a:cs typeface="Calibri Light" panose="020F0302020204030204" pitchFamily="34" charset="0"/>
+              </a:rPr>
+              <a:t>show iterative changes </a:t>
+            </a:r>
+          </a:p>
+          <a:p>
+            <a:pPr marL="171450" indent="-171450">
+              <a:buFont typeface="Arial" panose="020B0604020202020204" pitchFamily="34" charset="0"/>
+              <a:buChar char="•"/>
+            </a:pPr>
+            <a:r>
+              <a:rPr lang="en-US" sz="1100" dirty="0">
+                <a:solidFill>
+                  <a:srgbClr val="C00000"/>
+                </a:solidFill>
+                <a:latin typeface="Calibri Light" panose="020F0302020204030204" pitchFamily="34" charset="0"/>
+                <a:cs typeface="Calibri Light" panose="020F0302020204030204" pitchFamily="34" charset="0"/>
+              </a:rPr>
+              <a:t>show change results in model performance</a:t>
+            </a:r>
+          </a:p>
+          <a:p>
+            <a:pPr marL="171450" indent="-171450">
+              <a:buFont typeface="Arial" panose="020B0604020202020204" pitchFamily="34" charset="0"/>
+              <a:buChar char="•"/>
+            </a:pPr>
+            <a:r>
+              <a:rPr lang="en-US" sz="1100" dirty="0">
+                <a:solidFill>
+                  <a:srgbClr val="C00000"/>
+                </a:solidFill>
+                <a:latin typeface="Calibri Light" panose="020F0302020204030204" pitchFamily="34" charset="0"/>
+                <a:cs typeface="Calibri Light" panose="020F0302020204030204" pitchFamily="34" charset="0"/>
+              </a:rPr>
+              <a:t>documented in either a CSV/Excel table or in the Python script </a:t>
+            </a:r>
+          </a:p>
+          <a:p>
+            <a:pPr marL="171450" indent="-171450">
+              <a:buFont typeface="Arial" panose="020B0604020202020204" pitchFamily="34" charset="0"/>
+              <a:buChar char="•"/>
+            </a:pPr>
+            <a:r>
+              <a:rPr lang="en-US" sz="1100" dirty="0">
+                <a:solidFill>
+                  <a:srgbClr val="C00000"/>
+                </a:solidFill>
+                <a:latin typeface="Calibri Light" panose="020F0302020204030204" pitchFamily="34" charset="0"/>
+                <a:cs typeface="Calibri Light" panose="020F0302020204030204" pitchFamily="34" charset="0"/>
+              </a:rPr>
+              <a:t>Overall model performance is printed or displayed at the end of the script</a:t>
+            </a:r>
+          </a:p>
+          <a:p>
+            <a:endParaRPr lang="en-US" sz="1000" dirty="0">
+              <a:latin typeface="Calibri Light" panose="020F0302020204030204" pitchFamily="34" charset="0"/>
+              <a:cs typeface="Calibri Light" panose="020F0302020204030204" pitchFamily="34" charset="0"/>
+            </a:endParaRPr>
+          </a:p>
+          <a:p>
+            <a:r>
+              <a:rPr lang="en-US" sz="1600" b="1" dirty="0">
+                <a:solidFill>
+                  <a:srgbClr val="002060"/>
+                </a:solidFill>
+                <a:latin typeface="Calibri Light" panose="020F0302020204030204" pitchFamily="34" charset="0"/>
+                <a:cs typeface="Calibri Light" panose="020F0302020204030204" pitchFamily="34" charset="0"/>
+              </a:rPr>
+              <a:t>Stage</a:t>
+            </a:r>
+            <a:r>
+              <a:rPr lang="en-US" sz="1400" b="1" dirty="0">
+                <a:solidFill>
+                  <a:srgbClr val="002060"/>
+                </a:solidFill>
+                <a:latin typeface="Calibri Light" panose="020F0302020204030204" pitchFamily="34" charset="0"/>
+                <a:cs typeface="Calibri Light" panose="020F0302020204030204" pitchFamily="34" charset="0"/>
+              </a:rPr>
+              <a:t> </a:t>
+            </a:r>
+            <a:r>
+              <a:rPr lang="en-US" sz="1600" b="1" dirty="0">
+                <a:solidFill>
+                  <a:srgbClr val="002060"/>
+                </a:solidFill>
+                <a:latin typeface="Calibri Light" panose="020F0302020204030204" pitchFamily="34" charset="0"/>
+                <a:cs typeface="Calibri Light" panose="020F0302020204030204" pitchFamily="34" charset="0"/>
+              </a:rPr>
+              <a:t>3</a:t>
+            </a:r>
+            <a:endParaRPr lang="en-US" sz="1400" b="1" dirty="0">
+              <a:solidFill>
+                <a:srgbClr val="002060"/>
+              </a:solidFill>
+              <a:latin typeface="Calibri Light" panose="020F0302020204030204" pitchFamily="34" charset="0"/>
+              <a:cs typeface="Calibri Light" panose="020F0302020204030204" pitchFamily="34" charset="0"/>
+            </a:endParaRPr>
+          </a:p>
+          <a:p>
+            <a:r>
+              <a:rPr lang="en-US" sz="1100" b="1" dirty="0">
+                <a:solidFill>
+                  <a:srgbClr val="C00000"/>
+                </a:solidFill>
+                <a:latin typeface="Calibri Light" panose="020F0302020204030204" pitchFamily="34" charset="0"/>
+                <a:cs typeface="Calibri Light" panose="020F0302020204030204" pitchFamily="34" charset="0"/>
+              </a:rPr>
+              <a:t>Visualize</a:t>
+            </a:r>
+            <a:r>
+              <a:rPr lang="en-US" sz="1100" dirty="0">
+                <a:solidFill>
+                  <a:srgbClr val="C00000"/>
+                </a:solidFill>
+                <a:latin typeface="Calibri Light" panose="020F0302020204030204" pitchFamily="34" charset="0"/>
+                <a:cs typeface="Calibri Light" panose="020F0302020204030204" pitchFamily="34" charset="0"/>
+              </a:rPr>
+              <a:t> </a:t>
+            </a:r>
+          </a:p>
+          <a:p>
+            <a:r>
+              <a:rPr lang="en-US" sz="1100" dirty="0">
+                <a:solidFill>
+                  <a:srgbClr val="C00000"/>
+                </a:solidFill>
+                <a:latin typeface="Calibri Light" panose="020F0302020204030204" pitchFamily="34" charset="0"/>
+                <a:cs typeface="Calibri Light" panose="020F0302020204030204" pitchFamily="34" charset="0"/>
+              </a:rPr>
+              <a:t>- Create front end visuals with HTML, CSS, </a:t>
+            </a:r>
+            <a:r>
+              <a:rPr lang="en-US" sz="1100" dirty="0" err="1">
+                <a:solidFill>
+                  <a:srgbClr val="C00000"/>
+                </a:solidFill>
+                <a:latin typeface="Calibri Light" panose="020F0302020204030204" pitchFamily="34" charset="0"/>
+                <a:cs typeface="Calibri Light" panose="020F0302020204030204" pitchFamily="34" charset="0"/>
+              </a:rPr>
+              <a:t>Javascript</a:t>
+            </a:r>
+            <a:endParaRPr lang="en-US" sz="1100" dirty="0">
+              <a:solidFill>
+                <a:srgbClr val="C00000"/>
+              </a:solidFill>
+              <a:latin typeface="Calibri Light" panose="020F0302020204030204" pitchFamily="34" charset="0"/>
+              <a:cs typeface="Calibri Light" panose="020F0302020204030204" pitchFamily="34" charset="0"/>
+            </a:endParaRPr>
+          </a:p>
+          <a:p>
+            <a:endParaRPr lang="en-US" sz="1000" dirty="0">
+              <a:latin typeface="Calibri Light" panose="020F0302020204030204" pitchFamily="34" charset="0"/>
+              <a:cs typeface="Calibri Light" panose="020F0302020204030204" pitchFamily="34" charset="0"/>
+            </a:endParaRPr>
+          </a:p>
+          <a:p>
+            <a:r>
+              <a:rPr lang="en-US" sz="1600" b="1" dirty="0" err="1">
+                <a:solidFill>
+                  <a:srgbClr val="002060"/>
+                </a:solidFill>
+                <a:latin typeface="Calibri Light" panose="020F0302020204030204" pitchFamily="34" charset="0"/>
+                <a:cs typeface="Calibri Light" panose="020F0302020204030204" pitchFamily="34" charset="0"/>
+              </a:rPr>
+              <a:t>Delivberable</a:t>
+            </a:r>
+            <a:r>
+              <a:rPr lang="en-US" sz="1600" b="1" dirty="0">
+                <a:solidFill>
+                  <a:srgbClr val="002060"/>
+                </a:solidFill>
+                <a:latin typeface="Calibri Light" panose="020F0302020204030204" pitchFamily="34" charset="0"/>
+                <a:cs typeface="Calibri Light" panose="020F0302020204030204" pitchFamily="34" charset="0"/>
+              </a:rPr>
+              <a:t>: President</a:t>
+            </a:r>
+          </a:p>
+          <a:p>
+            <a:pPr marL="171450" indent="-171450">
+              <a:buFont typeface="Arial" panose="020B0604020202020204" pitchFamily="34" charset="0"/>
+              <a:buChar char="•"/>
+            </a:pPr>
+            <a:r>
+              <a:rPr lang="en-US" sz="1100" dirty="0">
+                <a:solidFill>
+                  <a:srgbClr val="C00000"/>
+                </a:solidFill>
+                <a:latin typeface="Calibri Light" panose="020F0302020204030204" pitchFamily="34" charset="0"/>
+                <a:cs typeface="Calibri Light" panose="020F0302020204030204" pitchFamily="34" charset="0"/>
+              </a:rPr>
+              <a:t>Chooses a president: </a:t>
+            </a:r>
+          </a:p>
+          <a:p>
+            <a:pPr marL="628650" lvl="1" indent="-171450">
+              <a:buFont typeface="Arial" panose="020B0604020202020204" pitchFamily="34" charset="0"/>
+              <a:buChar char="•"/>
+            </a:pPr>
+            <a:r>
+              <a:rPr lang="en-US" sz="1100" dirty="0">
+                <a:solidFill>
+                  <a:srgbClr val="C00000"/>
+                </a:solidFill>
+                <a:latin typeface="Calibri Light" panose="020F0302020204030204" pitchFamily="34" charset="0"/>
+                <a:cs typeface="Calibri Light" panose="020F0302020204030204" pitchFamily="34" charset="0"/>
+              </a:rPr>
+              <a:t>Drop Down, reduces the chance for error and none guesses</a:t>
+            </a:r>
+          </a:p>
+          <a:p>
+            <a:endParaRPr lang="en-US" sz="1100" dirty="0">
+              <a:solidFill>
+                <a:srgbClr val="C00000"/>
+              </a:solidFill>
+              <a:latin typeface="Calibri Light" panose="020F0302020204030204" pitchFamily="34" charset="0"/>
+              <a:cs typeface="Calibri Light" panose="020F0302020204030204" pitchFamily="34" charset="0"/>
+            </a:endParaRPr>
+          </a:p>
+          <a:p>
+            <a:pPr marL="171450" indent="-171450">
+              <a:buFont typeface="Arial" panose="020B0604020202020204" pitchFamily="34" charset="0"/>
+              <a:buChar char="•"/>
+            </a:pPr>
+            <a:r>
+              <a:rPr lang="en-US" sz="1100" dirty="0">
+                <a:solidFill>
+                  <a:srgbClr val="C00000"/>
+                </a:solidFill>
+                <a:latin typeface="Calibri Light" panose="020F0302020204030204" pitchFamily="34" charset="0"/>
+                <a:cs typeface="Calibri Light" panose="020F0302020204030204" pitchFamily="34" charset="0"/>
+              </a:rPr>
+              <a:t>Return predictions about the state of the country based on the President:</a:t>
+            </a:r>
+          </a:p>
+          <a:p>
+            <a:pPr marL="628650" lvl="1" indent="-171450">
+              <a:buFont typeface="Arial" panose="020B0604020202020204" pitchFamily="34" charset="0"/>
+              <a:buChar char="•"/>
+            </a:pPr>
+            <a:r>
+              <a:rPr lang="en-US" sz="1100" dirty="0">
+                <a:solidFill>
+                  <a:srgbClr val="C00000"/>
+                </a:solidFill>
+                <a:latin typeface="Calibri Light" panose="020F0302020204030204" pitchFamily="34" charset="0"/>
+                <a:cs typeface="Calibri Light" panose="020F0302020204030204" pitchFamily="34" charset="0"/>
+              </a:rPr>
+              <a:t>Would the  US be  prosperous? </a:t>
+            </a:r>
+          </a:p>
+          <a:p>
+            <a:pPr marL="1085850" lvl="2" indent="-171450">
+              <a:buFont typeface="Arial" panose="020B0604020202020204" pitchFamily="34" charset="0"/>
+              <a:buChar char="•"/>
+            </a:pPr>
+            <a:r>
+              <a:rPr lang="en-US" sz="1100" dirty="0">
+                <a:solidFill>
+                  <a:srgbClr val="C00000"/>
+                </a:solidFill>
+                <a:latin typeface="Calibri Light" panose="020F0302020204030204" pitchFamily="34" charset="0"/>
+                <a:cs typeface="Calibri Light" panose="020F0302020204030204" pitchFamily="34" charset="0"/>
+              </a:rPr>
+              <a:t>Predicted GDP growth (compare to latest dataset we can find) </a:t>
+            </a:r>
+          </a:p>
+          <a:p>
+            <a:pPr marL="1085850" lvl="2" indent="-171450">
+              <a:buFont typeface="Arial" panose="020B0604020202020204" pitchFamily="34" charset="0"/>
+              <a:buChar char="•"/>
+            </a:pPr>
+            <a:r>
+              <a:rPr lang="en-US" sz="1100" dirty="0">
+                <a:solidFill>
+                  <a:srgbClr val="C00000"/>
+                </a:solidFill>
+                <a:latin typeface="Calibri Light" panose="020F0302020204030204" pitchFamily="34" charset="0"/>
+                <a:cs typeface="Calibri Light" panose="020F0302020204030204" pitchFamily="34" charset="0"/>
+              </a:rPr>
+              <a:t>Print the predicted model performance</a:t>
+            </a:r>
+          </a:p>
+        </p:txBody>
+      </p:sp>
     </p:spTree>
     <p:extLst>
       <p:ext uri="{BB962C8B-B14F-4D97-AF65-F5344CB8AC3E}">
@@ -4228,8 +4861,8 @@
         </p:blipFill>
         <p:spPr>
           <a:xfrm>
-            <a:off x="-1" y="0"/>
-            <a:ext cx="3134681" cy="3246634"/>
+            <a:off x="9557861" y="3957320"/>
+            <a:ext cx="2608580" cy="2701744"/>
           </a:xfrm>
           <a:prstGeom prst="rect">
             <a:avLst/>
@@ -4258,14 +4891,252 @@
         </p:blipFill>
         <p:spPr>
           <a:xfrm>
-            <a:off x="9267825" y="3810000"/>
-            <a:ext cx="2924175" cy="3048000"/>
+            <a:off x="9608979" y="0"/>
+            <a:ext cx="2583021" cy="2692400"/>
           </a:xfrm>
           <a:prstGeom prst="rect">
             <a:avLst/>
           </a:prstGeom>
         </p:spPr>
       </p:pic>
+      <p:sp>
+        <p:nvSpPr>
+          <p:cNvPr id="2" name="TextBox 1">
+            <a:extLst>
+              <a:ext uri="{FF2B5EF4-FFF2-40B4-BE49-F238E27FC236}">
+                <a16:creationId xmlns:a16="http://schemas.microsoft.com/office/drawing/2014/main" id="{03E2A173-5257-907D-22FA-A119A41E7BD6}"/>
+              </a:ext>
+            </a:extLst>
+          </p:cNvPr>
+          <p:cNvSpPr txBox="1"/>
+          <p:nvPr/>
+        </p:nvSpPr>
+        <p:spPr>
+          <a:xfrm>
+            <a:off x="900429" y="518160"/>
+            <a:ext cx="8473441" cy="1323439"/>
+          </a:xfrm>
+          <a:prstGeom prst="rect">
+            <a:avLst/>
+          </a:prstGeom>
+          <a:noFill/>
+        </p:spPr>
+        <p:txBody>
+          <a:bodyPr wrap="square" rtlCol="0">
+            <a:spAutoFit/>
+          </a:bodyPr>
+          <a:lstStyle/>
+          <a:p>
+            <a:r>
+              <a:rPr lang="en-US" sz="8000" b="1" dirty="0">
+                <a:solidFill>
+                  <a:srgbClr val="C00000"/>
+                </a:solidFill>
+                <a:latin typeface="Calibri Light" panose="020F0302020204030204" pitchFamily="34" charset="0"/>
+                <a:cs typeface="Calibri Light" panose="020F0302020204030204" pitchFamily="34" charset="0"/>
+              </a:rPr>
+              <a:t>References/Sources</a:t>
+            </a:r>
+          </a:p>
+        </p:txBody>
+      </p:sp>
+      <p:sp>
+        <p:nvSpPr>
+          <p:cNvPr id="6" name="TextBox 5">
+            <a:extLst>
+              <a:ext uri="{FF2B5EF4-FFF2-40B4-BE49-F238E27FC236}">
+                <a16:creationId xmlns:a16="http://schemas.microsoft.com/office/drawing/2014/main" id="{C805D261-32E2-AF3B-D536-95B205DEB763}"/>
+              </a:ext>
+            </a:extLst>
+          </p:cNvPr>
+          <p:cNvSpPr txBox="1"/>
+          <p:nvPr/>
+        </p:nvSpPr>
+        <p:spPr>
+          <a:xfrm>
+            <a:off x="345440" y="2170698"/>
+            <a:ext cx="9583420" cy="2554545"/>
+          </a:xfrm>
+          <a:prstGeom prst="rect">
+            <a:avLst/>
+          </a:prstGeom>
+          <a:noFill/>
+        </p:spPr>
+        <p:txBody>
+          <a:bodyPr wrap="square">
+            <a:spAutoFit/>
+          </a:bodyPr>
+          <a:lstStyle/>
+          <a:p>
+            <a:pPr marL="285750" indent="-285750">
+              <a:buFont typeface="Arial" panose="020B0604020202020204" pitchFamily="34" charset="0"/>
+              <a:buChar char="•"/>
+            </a:pPr>
+            <a:r>
+              <a:rPr lang="en-US" sz="2000" dirty="0">
+                <a:solidFill>
+                  <a:srgbClr val="0070C0"/>
+                </a:solidFill>
+                <a:latin typeface="Calibri Light" panose="020F0302020204030204" pitchFamily="34" charset="0"/>
+                <a:cs typeface="Calibri Light" panose="020F0302020204030204" pitchFamily="34" charset="0"/>
+                <a:hlinkClick r:id="rId4"/>
+              </a:rPr>
+              <a:t>https://csvbase.com/roblillack/birthdates-of-us-presidents?op=gt&amp;n=40</a:t>
+            </a:r>
+            <a:endParaRPr lang="en-US" sz="2000" dirty="0">
+              <a:solidFill>
+                <a:srgbClr val="0070C0"/>
+              </a:solidFill>
+              <a:latin typeface="Calibri Light" panose="020F0302020204030204" pitchFamily="34" charset="0"/>
+              <a:cs typeface="Calibri Light" panose="020F0302020204030204" pitchFamily="34" charset="0"/>
+            </a:endParaRPr>
+          </a:p>
+          <a:p>
+            <a:pPr marL="285750" indent="-285750">
+              <a:buFont typeface="Arial" panose="020B0604020202020204" pitchFamily="34" charset="0"/>
+              <a:buChar char="•"/>
+            </a:pPr>
+            <a:r>
+              <a:rPr lang="en-US" sz="2000" dirty="0">
+                <a:solidFill>
+                  <a:srgbClr val="0070C0"/>
+                </a:solidFill>
+                <a:latin typeface="Calibri Light" panose="020F0302020204030204" pitchFamily="34" charset="0"/>
+                <a:cs typeface="Calibri Light" panose="020F0302020204030204" pitchFamily="34" charset="0"/>
+                <a:hlinkClick r:id="rId5"/>
+              </a:rPr>
+              <a:t>https://github.com/datasets/gdp-us/blob/master/year.csv</a:t>
+            </a:r>
+            <a:endParaRPr lang="en-US" sz="2000" dirty="0">
+              <a:solidFill>
+                <a:srgbClr val="0070C0"/>
+              </a:solidFill>
+              <a:latin typeface="Calibri Light" panose="020F0302020204030204" pitchFamily="34" charset="0"/>
+              <a:cs typeface="Calibri Light" panose="020F0302020204030204" pitchFamily="34" charset="0"/>
+            </a:endParaRPr>
+          </a:p>
+          <a:p>
+            <a:pPr marL="285750" indent="-285750">
+              <a:buFont typeface="Arial" panose="020B0604020202020204" pitchFamily="34" charset="0"/>
+              <a:buChar char="•"/>
+            </a:pPr>
+            <a:r>
+              <a:rPr lang="en-US" sz="2000" dirty="0">
+                <a:solidFill>
+                  <a:srgbClr val="0070C0"/>
+                </a:solidFill>
+                <a:latin typeface="Calibri Light" panose="020F0302020204030204" pitchFamily="34" charset="0"/>
+                <a:cs typeface="Calibri Light" panose="020F0302020204030204" pitchFamily="34" charset="0"/>
+                <a:hlinkClick r:id="rId6"/>
+              </a:rPr>
+              <a:t>https://www.theguardian.com/news/datablog/2012/oct/15/us-presidents-listed#data</a:t>
+            </a:r>
+            <a:endParaRPr lang="en-US" sz="2000" dirty="0">
+              <a:solidFill>
+                <a:srgbClr val="0070C0"/>
+              </a:solidFill>
+              <a:latin typeface="Calibri Light" panose="020F0302020204030204" pitchFamily="34" charset="0"/>
+              <a:cs typeface="Calibri Light" panose="020F0302020204030204" pitchFamily="34" charset="0"/>
+            </a:endParaRPr>
+          </a:p>
+          <a:p>
+            <a:pPr marL="285750" indent="-285750">
+              <a:buFont typeface="Arial" panose="020B0604020202020204" pitchFamily="34" charset="0"/>
+              <a:buChar char="•"/>
+            </a:pPr>
+            <a:r>
+              <a:rPr lang="en-US" sz="2000" dirty="0">
+                <a:solidFill>
+                  <a:srgbClr val="0070C0"/>
+                </a:solidFill>
+                <a:latin typeface="Calibri Light" panose="020F0302020204030204" pitchFamily="34" charset="0"/>
+                <a:cs typeface="Calibri Light" panose="020F0302020204030204" pitchFamily="34" charset="0"/>
+                <a:hlinkClick r:id="rId7"/>
+              </a:rPr>
+              <a:t>https://docs.google.com/spreadsheets/d/1dxg4mIyu02WaccBMS3JjhtQ3E0L4WrqfIf8oApJkpmw/edit?gid=0#gid=0</a:t>
+            </a:r>
+            <a:endParaRPr lang="en-US" sz="2000" dirty="0">
+              <a:solidFill>
+                <a:srgbClr val="0070C0"/>
+              </a:solidFill>
+              <a:latin typeface="Calibri Light" panose="020F0302020204030204" pitchFamily="34" charset="0"/>
+              <a:cs typeface="Calibri Light" panose="020F0302020204030204" pitchFamily="34" charset="0"/>
+            </a:endParaRPr>
+          </a:p>
+          <a:p>
+            <a:pPr marL="285750" indent="-285750">
+              <a:buFont typeface="Arial" panose="020B0604020202020204" pitchFamily="34" charset="0"/>
+              <a:buChar char="•"/>
+            </a:pPr>
+            <a:r>
+              <a:rPr lang="en-US" sz="2000" dirty="0">
+                <a:solidFill>
+                  <a:srgbClr val="0070C0"/>
+                </a:solidFill>
+                <a:latin typeface="Calibri Light" panose="020F0302020204030204" pitchFamily="34" charset="0"/>
+                <a:cs typeface="Calibri Light" panose="020F0302020204030204" pitchFamily="34" charset="0"/>
+                <a:hlinkClick r:id="rId8"/>
+              </a:rPr>
+              <a:t>https://chatgpt.com/</a:t>
+            </a:r>
+            <a:endParaRPr lang="en-US" sz="2000" dirty="0">
+              <a:solidFill>
+                <a:srgbClr val="0070C0"/>
+              </a:solidFill>
+              <a:latin typeface="Calibri Light" panose="020F0302020204030204" pitchFamily="34" charset="0"/>
+              <a:cs typeface="Calibri Light" panose="020F0302020204030204" pitchFamily="34" charset="0"/>
+            </a:endParaRPr>
+          </a:p>
+          <a:p>
+            <a:pPr marL="285750" indent="-285750">
+              <a:buFont typeface="Arial" panose="020B0604020202020204" pitchFamily="34" charset="0"/>
+              <a:buChar char="•"/>
+            </a:pPr>
+            <a:r>
+              <a:rPr lang="en-US" sz="2000" dirty="0">
+                <a:solidFill>
+                  <a:srgbClr val="0070C0"/>
+                </a:solidFill>
+                <a:latin typeface="Calibri Light" panose="020F0302020204030204" pitchFamily="34" charset="0"/>
+                <a:cs typeface="Calibri Light" panose="020F0302020204030204" pitchFamily="34" charset="0"/>
+                <a:hlinkClick r:id="rId9"/>
+              </a:rPr>
+              <a:t>https://www.measuringworth.com/datasets/usgdp/result.php</a:t>
+            </a:r>
+            <a:endParaRPr lang="en-US" sz="2000" dirty="0">
+              <a:solidFill>
+                <a:srgbClr val="0070C0"/>
+              </a:solidFill>
+              <a:latin typeface="Calibri Light" panose="020F0302020204030204" pitchFamily="34" charset="0"/>
+              <a:cs typeface="Calibri Light" panose="020F0302020204030204" pitchFamily="34" charset="0"/>
+            </a:endParaRPr>
+          </a:p>
+          <a:p>
+            <a:pPr marL="285750" indent="-285750">
+              <a:buFont typeface="Arial" panose="020B0604020202020204" pitchFamily="34" charset="0"/>
+              <a:buChar char="•"/>
+            </a:pPr>
+            <a:r>
+              <a:rPr lang="en-US" sz="2000" dirty="0">
+                <a:solidFill>
+                  <a:srgbClr val="0070C0"/>
+                </a:solidFill>
+                <a:latin typeface="Calibri Light" panose="020F0302020204030204" pitchFamily="34" charset="0"/>
+                <a:cs typeface="Calibri Light" panose="020F0302020204030204" pitchFamily="34" charset="0"/>
+                <a:hlinkClick r:id="rId10"/>
+              </a:rPr>
+              <a:t>https://www.whitehouse.gov/about-the-white-house/presidents/</a:t>
+            </a:r>
+            <a:endParaRPr lang="en-US" sz="2000" dirty="0">
+              <a:solidFill>
+                <a:srgbClr val="0070C0"/>
+              </a:solidFill>
+              <a:latin typeface="Calibri Light" panose="020F0302020204030204" pitchFamily="34" charset="0"/>
+              <a:cs typeface="Calibri Light" panose="020F0302020204030204" pitchFamily="34" charset="0"/>
+            </a:endParaRPr>
+          </a:p>
+        </p:txBody>
+      </p:sp>
     </p:spTree>
     <p:extLst>
       <p:ext uri="{BB962C8B-B14F-4D97-AF65-F5344CB8AC3E}">

</xml_diff>

<commit_message>
added additional data for use and sited resources on read me
</commit_message>
<xml_diff>
--- a/Presidential GDP.pptx
+++ b/Presidential GDP.pptx
@@ -266,7 +266,7 @@
           <a:p>
             <a:fld id="{08B334E2-AFE7-46EE-802B-916E126B6801}" type="datetimeFigureOut">
               <a:rPr lang="en-US" smtClean="0"/>
-              <a:t>8/29/2024</a:t>
+              <a:t>9/3/2024</a:t>
             </a:fld>
             <a:endParaRPr lang="en-US"/>
           </a:p>
@@ -464,7 +464,7 @@
           <a:p>
             <a:fld id="{08B334E2-AFE7-46EE-802B-916E126B6801}" type="datetimeFigureOut">
               <a:rPr lang="en-US" smtClean="0"/>
-              <a:t>8/29/2024</a:t>
+              <a:t>9/3/2024</a:t>
             </a:fld>
             <a:endParaRPr lang="en-US"/>
           </a:p>
@@ -672,7 +672,7 @@
           <a:p>
             <a:fld id="{08B334E2-AFE7-46EE-802B-916E126B6801}" type="datetimeFigureOut">
               <a:rPr lang="en-US" smtClean="0"/>
-              <a:t>8/29/2024</a:t>
+              <a:t>9/3/2024</a:t>
             </a:fld>
             <a:endParaRPr lang="en-US"/>
           </a:p>
@@ -870,7 +870,7 @@
           <a:p>
             <a:fld id="{08B334E2-AFE7-46EE-802B-916E126B6801}" type="datetimeFigureOut">
               <a:rPr lang="en-US" smtClean="0"/>
-              <a:t>8/29/2024</a:t>
+              <a:t>9/3/2024</a:t>
             </a:fld>
             <a:endParaRPr lang="en-US"/>
           </a:p>
@@ -1145,7 +1145,7 @@
           <a:p>
             <a:fld id="{08B334E2-AFE7-46EE-802B-916E126B6801}" type="datetimeFigureOut">
               <a:rPr lang="en-US" smtClean="0"/>
-              <a:t>8/29/2024</a:t>
+              <a:t>9/3/2024</a:t>
             </a:fld>
             <a:endParaRPr lang="en-US"/>
           </a:p>
@@ -1410,7 +1410,7 @@
           <a:p>
             <a:fld id="{08B334E2-AFE7-46EE-802B-916E126B6801}" type="datetimeFigureOut">
               <a:rPr lang="en-US" smtClean="0"/>
-              <a:t>8/29/2024</a:t>
+              <a:t>9/3/2024</a:t>
             </a:fld>
             <a:endParaRPr lang="en-US"/>
           </a:p>
@@ -1822,7 +1822,7 @@
           <a:p>
             <a:fld id="{08B334E2-AFE7-46EE-802B-916E126B6801}" type="datetimeFigureOut">
               <a:rPr lang="en-US" smtClean="0"/>
-              <a:t>8/29/2024</a:t>
+              <a:t>9/3/2024</a:t>
             </a:fld>
             <a:endParaRPr lang="en-US"/>
           </a:p>
@@ -1963,7 +1963,7 @@
           <a:p>
             <a:fld id="{08B334E2-AFE7-46EE-802B-916E126B6801}" type="datetimeFigureOut">
               <a:rPr lang="en-US" smtClean="0"/>
-              <a:t>8/29/2024</a:t>
+              <a:t>9/3/2024</a:t>
             </a:fld>
             <a:endParaRPr lang="en-US"/>
           </a:p>
@@ -2076,7 +2076,7 @@
           <a:p>
             <a:fld id="{08B334E2-AFE7-46EE-802B-916E126B6801}" type="datetimeFigureOut">
               <a:rPr lang="en-US" smtClean="0"/>
-              <a:t>8/29/2024</a:t>
+              <a:t>9/3/2024</a:t>
             </a:fld>
             <a:endParaRPr lang="en-US"/>
           </a:p>
@@ -2387,7 +2387,7 @@
           <a:p>
             <a:fld id="{08B334E2-AFE7-46EE-802B-916E126B6801}" type="datetimeFigureOut">
               <a:rPr lang="en-US" smtClean="0"/>
-              <a:t>8/29/2024</a:t>
+              <a:t>9/3/2024</a:t>
             </a:fld>
             <a:endParaRPr lang="en-US"/>
           </a:p>
@@ -2675,7 +2675,7 @@
           <a:p>
             <a:fld id="{08B334E2-AFE7-46EE-802B-916E126B6801}" type="datetimeFigureOut">
               <a:rPr lang="en-US" smtClean="0"/>
-              <a:t>8/29/2024</a:t>
+              <a:t>9/3/2024</a:t>
             </a:fld>
             <a:endParaRPr lang="en-US"/>
           </a:p>
@@ -2916,7 +2916,7 @@
           <a:p>
             <a:fld id="{08B334E2-AFE7-46EE-802B-916E126B6801}" type="datetimeFigureOut">
               <a:rPr lang="en-US" smtClean="0"/>
-              <a:t>8/29/2024</a:t>
+              <a:t>9/3/2024</a:t>
             </a:fld>
             <a:endParaRPr lang="en-US"/>
           </a:p>
@@ -4082,24 +4082,14 @@
           </a:p>
           <a:p>
             <a:r>
-              <a:rPr lang="en-US" sz="1600" b="1" dirty="0" err="1">
+              <a:rPr lang="en-US" sz="1600" b="1" dirty="0">
                 <a:solidFill>
                   <a:srgbClr val="002060"/>
                 </a:solidFill>
                 <a:latin typeface="Calibri Light" panose="020F0302020204030204" pitchFamily="34" charset="0"/>
                 <a:cs typeface="Calibri Light" panose="020F0302020204030204" pitchFamily="34" charset="0"/>
               </a:rPr>
-              <a:t>Delivberable</a:t>
-            </a:r>
-            <a:r>
-              <a:rPr lang="en-US" sz="1600" b="1" dirty="0">
-                <a:solidFill>
-                  <a:srgbClr val="002060"/>
-                </a:solidFill>
-                <a:latin typeface="Calibri Light" panose="020F0302020204030204" pitchFamily="34" charset="0"/>
-                <a:cs typeface="Calibri Light" panose="020F0302020204030204" pitchFamily="34" charset="0"/>
-              </a:rPr>
-              <a:t>: President</a:t>
+              <a:t>Deliverable: President</a:t>
             </a:r>
           </a:p>
           <a:p>

</xml_diff>